<commit_message>
update title and correct character
</commit_message>
<xml_diff>
--- a/بوابة الشكايات الخاصة بالمواطنين.pptx
+++ b/بوابة الشكايات الخاصة بالمواطنين.pptx
@@ -249,7 +249,7 @@
           <a:p>
             <a:fld id="{592301B2-BDB7-46C0-A49C-316759287F94}" type="datetimeFigureOut">
               <a:rPr lang="ar-DZ" smtClean="0"/>
-              <a:t>27-03-1445</a:t>
+              <a:t>20-01-1446</a:t>
             </a:fld>
             <a:endParaRPr lang="ar-DZ"/>
           </a:p>
@@ -291,7 +291,7 @@
           <a:p>
             <a:fld id="{7A871F42-AFA7-4021-BF75-71E66225CD7F}" type="slidenum">
               <a:rPr lang="ar-DZ" smtClean="0"/>
-              <a:t>‹#›</a:t>
+              <a:t>‹N°›</a:t>
             </a:fld>
             <a:endParaRPr lang="ar-DZ"/>
           </a:p>
@@ -419,7 +419,7 @@
           <a:p>
             <a:fld id="{592301B2-BDB7-46C0-A49C-316759287F94}" type="datetimeFigureOut">
               <a:rPr lang="ar-DZ" smtClean="0"/>
-              <a:t>27-03-1445</a:t>
+              <a:t>20-01-1446</a:t>
             </a:fld>
             <a:endParaRPr lang="ar-DZ"/>
           </a:p>
@@ -461,7 +461,7 @@
           <a:p>
             <a:fld id="{7A871F42-AFA7-4021-BF75-71E66225CD7F}" type="slidenum">
               <a:rPr lang="ar-DZ" smtClean="0"/>
-              <a:t>‹#›</a:t>
+              <a:t>‹N°›</a:t>
             </a:fld>
             <a:endParaRPr lang="ar-DZ"/>
           </a:p>
@@ -599,7 +599,7 @@
           <a:p>
             <a:fld id="{592301B2-BDB7-46C0-A49C-316759287F94}" type="datetimeFigureOut">
               <a:rPr lang="ar-DZ" smtClean="0"/>
-              <a:t>27-03-1445</a:t>
+              <a:t>20-01-1446</a:t>
             </a:fld>
             <a:endParaRPr lang="ar-DZ"/>
           </a:p>
@@ -641,7 +641,7 @@
           <a:p>
             <a:fld id="{7A871F42-AFA7-4021-BF75-71E66225CD7F}" type="slidenum">
               <a:rPr lang="ar-DZ" smtClean="0"/>
-              <a:t>‹#›</a:t>
+              <a:t>‹N°›</a:t>
             </a:fld>
             <a:endParaRPr lang="ar-DZ"/>
           </a:p>
@@ -769,7 +769,7 @@
           <a:p>
             <a:fld id="{592301B2-BDB7-46C0-A49C-316759287F94}" type="datetimeFigureOut">
               <a:rPr lang="ar-DZ" smtClean="0"/>
-              <a:t>27-03-1445</a:t>
+              <a:t>20-01-1446</a:t>
             </a:fld>
             <a:endParaRPr lang="ar-DZ"/>
           </a:p>
@@ -811,7 +811,7 @@
           <a:p>
             <a:fld id="{7A871F42-AFA7-4021-BF75-71E66225CD7F}" type="slidenum">
               <a:rPr lang="ar-DZ" smtClean="0"/>
-              <a:t>‹#›</a:t>
+              <a:t>‹N°›</a:t>
             </a:fld>
             <a:endParaRPr lang="ar-DZ"/>
           </a:p>
@@ -1015,7 +1015,7 @@
           <a:p>
             <a:fld id="{592301B2-BDB7-46C0-A49C-316759287F94}" type="datetimeFigureOut">
               <a:rPr lang="ar-DZ" smtClean="0"/>
-              <a:t>27-03-1445</a:t>
+              <a:t>20-01-1446</a:t>
             </a:fld>
             <a:endParaRPr lang="ar-DZ"/>
           </a:p>
@@ -1057,7 +1057,7 @@
           <a:p>
             <a:fld id="{7A871F42-AFA7-4021-BF75-71E66225CD7F}" type="slidenum">
               <a:rPr lang="ar-DZ" smtClean="0"/>
-              <a:t>‹#›</a:t>
+              <a:t>‹N°›</a:t>
             </a:fld>
             <a:endParaRPr lang="ar-DZ"/>
           </a:p>
@@ -1247,7 +1247,7 @@
           <a:p>
             <a:fld id="{592301B2-BDB7-46C0-A49C-316759287F94}" type="datetimeFigureOut">
               <a:rPr lang="ar-DZ" smtClean="0"/>
-              <a:t>27-03-1445</a:t>
+              <a:t>20-01-1446</a:t>
             </a:fld>
             <a:endParaRPr lang="ar-DZ"/>
           </a:p>
@@ -1289,7 +1289,7 @@
           <a:p>
             <a:fld id="{7A871F42-AFA7-4021-BF75-71E66225CD7F}" type="slidenum">
               <a:rPr lang="ar-DZ" smtClean="0"/>
-              <a:t>‹#›</a:t>
+              <a:t>‹N°›</a:t>
             </a:fld>
             <a:endParaRPr lang="ar-DZ"/>
           </a:p>
@@ -1614,7 +1614,7 @@
           <a:p>
             <a:fld id="{592301B2-BDB7-46C0-A49C-316759287F94}" type="datetimeFigureOut">
               <a:rPr lang="ar-DZ" smtClean="0"/>
-              <a:t>27-03-1445</a:t>
+              <a:t>20-01-1446</a:t>
             </a:fld>
             <a:endParaRPr lang="ar-DZ"/>
           </a:p>
@@ -1656,7 +1656,7 @@
           <a:p>
             <a:fld id="{7A871F42-AFA7-4021-BF75-71E66225CD7F}" type="slidenum">
               <a:rPr lang="ar-DZ" smtClean="0"/>
-              <a:t>‹#›</a:t>
+              <a:t>‹N°›</a:t>
             </a:fld>
             <a:endParaRPr lang="ar-DZ"/>
           </a:p>
@@ -1732,7 +1732,7 @@
           <a:p>
             <a:fld id="{592301B2-BDB7-46C0-A49C-316759287F94}" type="datetimeFigureOut">
               <a:rPr lang="ar-DZ" smtClean="0"/>
-              <a:t>27-03-1445</a:t>
+              <a:t>20-01-1446</a:t>
             </a:fld>
             <a:endParaRPr lang="ar-DZ"/>
           </a:p>
@@ -1774,7 +1774,7 @@
           <a:p>
             <a:fld id="{7A871F42-AFA7-4021-BF75-71E66225CD7F}" type="slidenum">
               <a:rPr lang="ar-DZ" smtClean="0"/>
-              <a:t>‹#›</a:t>
+              <a:t>‹N°›</a:t>
             </a:fld>
             <a:endParaRPr lang="ar-DZ"/>
           </a:p>
@@ -1827,7 +1827,7 @@
           <a:p>
             <a:fld id="{592301B2-BDB7-46C0-A49C-316759287F94}" type="datetimeFigureOut">
               <a:rPr lang="ar-DZ" smtClean="0"/>
-              <a:t>27-03-1445</a:t>
+              <a:t>20-01-1446</a:t>
             </a:fld>
             <a:endParaRPr lang="ar-DZ"/>
           </a:p>
@@ -1869,7 +1869,7 @@
           <a:p>
             <a:fld id="{7A871F42-AFA7-4021-BF75-71E66225CD7F}" type="slidenum">
               <a:rPr lang="ar-DZ" smtClean="0"/>
-              <a:t>‹#›</a:t>
+              <a:t>‹N°›</a:t>
             </a:fld>
             <a:endParaRPr lang="ar-DZ"/>
           </a:p>
@@ -2104,7 +2104,7 @@
           <a:p>
             <a:fld id="{592301B2-BDB7-46C0-A49C-316759287F94}" type="datetimeFigureOut">
               <a:rPr lang="ar-DZ" smtClean="0"/>
-              <a:t>27-03-1445</a:t>
+              <a:t>20-01-1446</a:t>
             </a:fld>
             <a:endParaRPr lang="ar-DZ"/>
           </a:p>
@@ -2146,7 +2146,7 @@
           <a:p>
             <a:fld id="{7A871F42-AFA7-4021-BF75-71E66225CD7F}" type="slidenum">
               <a:rPr lang="ar-DZ" smtClean="0"/>
-              <a:t>‹#›</a:t>
+              <a:t>‹N°›</a:t>
             </a:fld>
             <a:endParaRPr lang="ar-DZ"/>
           </a:p>
@@ -2357,7 +2357,7 @@
           <a:p>
             <a:fld id="{592301B2-BDB7-46C0-A49C-316759287F94}" type="datetimeFigureOut">
               <a:rPr lang="ar-DZ" smtClean="0"/>
-              <a:t>27-03-1445</a:t>
+              <a:t>20-01-1446</a:t>
             </a:fld>
             <a:endParaRPr lang="ar-DZ"/>
           </a:p>
@@ -2399,7 +2399,7 @@
           <a:p>
             <a:fld id="{7A871F42-AFA7-4021-BF75-71E66225CD7F}" type="slidenum">
               <a:rPr lang="ar-DZ" smtClean="0"/>
-              <a:t>‹#›</a:t>
+              <a:t>‹N°›</a:t>
             </a:fld>
             <a:endParaRPr lang="ar-DZ"/>
           </a:p>
@@ -2570,7 +2570,7 @@
           <a:p>
             <a:fld id="{592301B2-BDB7-46C0-A49C-316759287F94}" type="datetimeFigureOut">
               <a:rPr lang="ar-DZ" smtClean="0"/>
-              <a:t>27-03-1445</a:t>
+              <a:t>20-01-1446</a:t>
             </a:fld>
             <a:endParaRPr lang="ar-DZ"/>
           </a:p>
@@ -2648,7 +2648,7 @@
           <a:p>
             <a:fld id="{7A871F42-AFA7-4021-BF75-71E66225CD7F}" type="slidenum">
               <a:rPr lang="ar-DZ" smtClean="0"/>
-              <a:t>‹#›</a:t>
+              <a:t>‹N°›</a:t>
             </a:fld>
             <a:endParaRPr lang="ar-DZ"/>
           </a:p>
@@ -3252,15 +3252,7 @@
             </a:pPr>
             <a:r>
               <a:rPr lang="ar-MA" dirty="0" smtClean="0"/>
-              <a:t>فدان - تفردوست -ايت صالح -تغروت بومعلا- الحرش ايت ويحيان- اشناعكي اسكورن- تاجينت- سكورة المركز </a:t>
-            </a:r>
-            <a:r>
-              <a:rPr lang="ar-MA" dirty="0" smtClean="0"/>
-              <a:t>–بوعاصم- </a:t>
-            </a:r>
-            <a:r>
-              <a:rPr lang="ar-MA" dirty="0" smtClean="0"/>
-              <a:t>سيدي محيو- عبادة</a:t>
+              <a:t>فدان - تفردوست -ايت صالح -تغروت بومعلا- الحرش ايت ويحيان- اشناعكي اسكورن- تاجينت- سكورة المركز –بوعاصم- سيدي محيو- عبادة</a:t>
             </a:r>
             <a:r>
               <a:rPr lang="ar-MA" dirty="0"/>
@@ -3688,7 +3680,12 @@
             <p:ph type="title"/>
           </p:nvPr>
         </p:nvSpPr>
-        <p:spPr/>
+        <p:spPr>
+          <a:xfrm>
+            <a:off x="1018504" y="452102"/>
+            <a:ext cx="10515600" cy="1325563"/>
+          </a:xfrm>
+        </p:spPr>
         <p:txBody>
           <a:bodyPr/>
           <a:lstStyle/>

</xml_diff>